<commit_message>
Updated the class Diagram
</commit_message>
<xml_diff>
--- a/Documents/Our Docs/Slides/Sprint3PresentationAdrian.pptx
+++ b/Documents/Our Docs/Slides/Sprint3PresentationAdrian.pptx
@@ -207,7 +207,7 @@
           <a:p>
             <a:fld id="{87857EF3-CB16-4D9F-BA52-FAE19D95CBEC}" type="datetimeFigureOut">
               <a:rPr lang="en-US" smtClean="0"/>
-              <a:t>3/16/2015</a:t>
+              <a:t>3/17/2015</a:t>
             </a:fld>
             <a:endParaRPr lang="en-US"/>
           </a:p>
@@ -690,7 +690,7 @@
           <a:p>
             <a:fld id="{EF7662E3-674D-464C-A6F0-577B5998971D}" type="datetimeFigureOut">
               <a:rPr lang="en-US" smtClean="0"/>
-              <a:t>3/16/2015</a:t>
+              <a:t>3/17/2015</a:t>
             </a:fld>
             <a:endParaRPr lang="en-US"/>
           </a:p>
@@ -860,7 +860,7 @@
           <a:p>
             <a:fld id="{EF7662E3-674D-464C-A6F0-577B5998971D}" type="datetimeFigureOut">
               <a:rPr lang="en-US" smtClean="0"/>
-              <a:t>3/16/2015</a:t>
+              <a:t>3/17/2015</a:t>
             </a:fld>
             <a:endParaRPr lang="en-US"/>
           </a:p>
@@ -1040,7 +1040,7 @@
           <a:p>
             <a:fld id="{EF7662E3-674D-464C-A6F0-577B5998971D}" type="datetimeFigureOut">
               <a:rPr lang="en-US" smtClean="0"/>
-              <a:t>3/16/2015</a:t>
+              <a:t>3/17/2015</a:t>
             </a:fld>
             <a:endParaRPr lang="en-US"/>
           </a:p>
@@ -1210,7 +1210,7 @@
           <a:p>
             <a:fld id="{EF7662E3-674D-464C-A6F0-577B5998971D}" type="datetimeFigureOut">
               <a:rPr lang="en-US" smtClean="0"/>
-              <a:t>3/16/2015</a:t>
+              <a:t>3/17/2015</a:t>
             </a:fld>
             <a:endParaRPr lang="en-US"/>
           </a:p>
@@ -1456,7 +1456,7 @@
           <a:p>
             <a:fld id="{EF7662E3-674D-464C-A6F0-577B5998971D}" type="datetimeFigureOut">
               <a:rPr lang="en-US" smtClean="0"/>
-              <a:t>3/16/2015</a:t>
+              <a:t>3/17/2015</a:t>
             </a:fld>
             <a:endParaRPr lang="en-US"/>
           </a:p>
@@ -1688,7 +1688,7 @@
           <a:p>
             <a:fld id="{EF7662E3-674D-464C-A6F0-577B5998971D}" type="datetimeFigureOut">
               <a:rPr lang="en-US" smtClean="0"/>
-              <a:t>3/16/2015</a:t>
+              <a:t>3/17/2015</a:t>
             </a:fld>
             <a:endParaRPr lang="en-US"/>
           </a:p>
@@ -2055,7 +2055,7 @@
           <a:p>
             <a:fld id="{EF7662E3-674D-464C-A6F0-577B5998971D}" type="datetimeFigureOut">
               <a:rPr lang="en-US" smtClean="0"/>
-              <a:t>3/16/2015</a:t>
+              <a:t>3/17/2015</a:t>
             </a:fld>
             <a:endParaRPr lang="en-US"/>
           </a:p>
@@ -2173,7 +2173,7 @@
           <a:p>
             <a:fld id="{EF7662E3-674D-464C-A6F0-577B5998971D}" type="datetimeFigureOut">
               <a:rPr lang="en-US" smtClean="0"/>
-              <a:t>3/16/2015</a:t>
+              <a:t>3/17/2015</a:t>
             </a:fld>
             <a:endParaRPr lang="en-US"/>
           </a:p>
@@ -2268,7 +2268,7 @@
           <a:p>
             <a:fld id="{EF7662E3-674D-464C-A6F0-577B5998971D}" type="datetimeFigureOut">
               <a:rPr lang="en-US" smtClean="0"/>
-              <a:t>3/16/2015</a:t>
+              <a:t>3/17/2015</a:t>
             </a:fld>
             <a:endParaRPr lang="en-US"/>
           </a:p>
@@ -2545,7 +2545,7 @@
           <a:p>
             <a:fld id="{EF7662E3-674D-464C-A6F0-577B5998971D}" type="datetimeFigureOut">
               <a:rPr lang="en-US" smtClean="0"/>
-              <a:t>3/16/2015</a:t>
+              <a:t>3/17/2015</a:t>
             </a:fld>
             <a:endParaRPr lang="en-US"/>
           </a:p>
@@ -2798,7 +2798,7 @@
           <a:p>
             <a:fld id="{EF7662E3-674D-464C-A6F0-577B5998971D}" type="datetimeFigureOut">
               <a:rPr lang="en-US" smtClean="0"/>
-              <a:t>3/16/2015</a:t>
+              <a:t>3/17/2015</a:t>
             </a:fld>
             <a:endParaRPr lang="en-US"/>
           </a:p>
@@ -3011,7 +3011,7 @@
           <a:p>
             <a:fld id="{EF7662E3-674D-464C-A6F0-577B5998971D}" type="datetimeFigureOut">
               <a:rPr lang="en-US" smtClean="0"/>
-              <a:t>3/16/2015</a:t>
+              <a:t>3/17/2015</a:t>
             </a:fld>
             <a:endParaRPr lang="en-US"/>
           </a:p>
@@ -3864,11 +3864,7 @@
           <a:p>
             <a:r>
               <a:rPr lang="en-US" sz="5400" b="1" dirty="0" smtClean="0"/>
-              <a:t>Sprint </a:t>
-            </a:r>
-            <a:r>
-              <a:rPr lang="en-US" sz="5400" b="1" dirty="0" smtClean="0"/>
-              <a:t>3 Stories</a:t>
+              <a:t>Sprint 3 Stories</a:t>
             </a:r>
             <a:endParaRPr lang="en-US" sz="5400" b="1" dirty="0"/>
           </a:p>
@@ -3898,15 +3894,7 @@
           <a:p>
             <a:r>
               <a:rPr lang="en-US" sz="5400" b="1" dirty="0" smtClean="0"/>
-              <a:t>My Sprint </a:t>
-            </a:r>
-            <a:r>
-              <a:rPr lang="en-US" sz="5400" b="1" dirty="0" smtClean="0"/>
-              <a:t>3 </a:t>
-            </a:r>
-            <a:r>
-              <a:rPr lang="en-US" sz="5400" b="1" dirty="0" smtClean="0"/>
-              <a:t>Stories</a:t>
+              <a:t>My Sprint 3 Stories</a:t>
             </a:r>
             <a:endParaRPr lang="en-US" sz="5400" b="1" dirty="0"/>
           </a:p>
@@ -3936,11 +3924,7 @@
           <a:p>
             <a:r>
               <a:rPr lang="en-US" sz="4800" b="1" dirty="0" smtClean="0"/>
-              <a:t>Total </a:t>
-            </a:r>
-            <a:r>
-              <a:rPr lang="en-US" sz="4800" b="1" dirty="0" smtClean="0"/>
-              <a:t>?? pts</a:t>
+              <a:t>Total ?? pts</a:t>
             </a:r>
             <a:endParaRPr lang="en-US" sz="4800" b="1" dirty="0"/>
           </a:p>
@@ -3970,11 +3954,7 @@
           <a:p>
             <a:r>
               <a:rPr lang="en-US" sz="4800" b="1" dirty="0" smtClean="0"/>
-              <a:t>Total </a:t>
-            </a:r>
-            <a:r>
-              <a:rPr lang="en-US" sz="4800" b="1" dirty="0" smtClean="0"/>
-              <a:t>??</a:t>
+              <a:t>Total ??</a:t>
             </a:r>
             <a:endParaRPr lang="en-US" sz="4800" b="1" dirty="0"/>
           </a:p>
@@ -4411,11 +4391,7 @@
             <a:pPr algn="ctr"/>
             <a:r>
               <a:rPr lang="en-US" sz="5400" b="1" dirty="0" smtClean="0"/>
-              <a:t>Use </a:t>
-            </a:r>
-            <a:r>
-              <a:rPr lang="en-US" sz="5400" b="1" dirty="0" smtClean="0"/>
-              <a:t>Cases</a:t>
+              <a:t>Use Cases</a:t>
             </a:r>
             <a:endParaRPr lang="en-US" sz="5400" b="1" dirty="0"/>
           </a:p>
@@ -4603,11 +4579,7 @@
             <a:pPr algn="ctr"/>
             <a:r>
               <a:rPr lang="en-US" sz="5400" b="1" dirty="0" smtClean="0"/>
-              <a:t>Class Diagram </a:t>
-            </a:r>
-            <a:r>
-              <a:rPr lang="en-US" sz="5400" b="1" dirty="0" smtClean="0"/>
-              <a:t>(Utilization Dashboard)</a:t>
+              <a:t>Class Diagram (Utilization Dashboard)</a:t>
             </a:r>
             <a:endParaRPr lang="en-US" sz="5400" b="1" dirty="0"/>
           </a:p>
@@ -4615,7 +4587,7 @@
       </p:sp>
       <p:pic>
         <p:nvPicPr>
-          <p:cNvPr id="6" name="Picture 5"/>
+          <p:cNvPr id="2" name="Picture 1"/>
           <p:cNvPicPr>
             <a:picLocks noChangeAspect="1"/>
           </p:cNvPicPr>
@@ -4635,8 +4607,8 @@
         </p:blipFill>
         <p:spPr>
           <a:xfrm>
-            <a:off x="4380009" y="1251115"/>
-            <a:ext cx="3740409" cy="4958616"/>
+            <a:off x="3057099" y="923330"/>
+            <a:ext cx="5677468" cy="5791369"/>
           </a:xfrm>
           <a:prstGeom prst="rect">
             <a:avLst/>
@@ -4705,19 +4677,7 @@
             <a:pPr algn="ctr"/>
             <a:r>
               <a:rPr lang="en-US" sz="5400" b="1" dirty="0" smtClean="0"/>
-              <a:t>Sequence Diagram </a:t>
-            </a:r>
-            <a:r>
-              <a:rPr lang="en-US" sz="5400" b="1" dirty="0" smtClean="0"/>
-              <a:t>(Pul</a:t>
-            </a:r>
-            <a:r>
-              <a:rPr lang="en-US" sz="5400" b="1" dirty="0" smtClean="0"/>
-              <a:t>l New tickets</a:t>
-            </a:r>
-            <a:r>
-              <a:rPr lang="en-US" sz="5400" b="1" dirty="0" smtClean="0"/>
-              <a:t>)</a:t>
+              <a:t>Sequence Diagram (Pull New tickets)</a:t>
             </a:r>
             <a:endParaRPr lang="en-US" sz="5400" b="1" dirty="0"/>
           </a:p>

</xml_diff>

<commit_message>
Fixed Sprint 3 presentation
</commit_message>
<xml_diff>
--- a/Documents/Our Docs/Slides/Sprint3PresentationAdrian.pptx
+++ b/Documents/Our Docs/Slides/Sprint3PresentationAdrian.pptx
@@ -3773,11 +3773,7 @@
           <a:p>
             <a:r>
               <a:rPr lang="en-US" sz="4800" b="1" dirty="0" smtClean="0"/>
-              <a:t>Total </a:t>
-            </a:r>
-            <a:r>
-              <a:rPr lang="en-US" sz="4800" b="1" dirty="0" smtClean="0"/>
-              <a:t>36 pts</a:t>
+              <a:t>Total 36 pts</a:t>
             </a:r>
             <a:endParaRPr lang="en-US" sz="4800" b="1" dirty="0"/>
           </a:p>
@@ -3927,8 +3923,16 @@
           <a:lstStyle/>
           <a:p>
             <a:r>
+              <a:rPr lang="en-US" sz="4800" b="1" smtClean="0"/>
+              <a:t>Total </a:t>
+            </a:r>
+            <a:r>
+              <a:rPr lang="en-US" sz="4800" b="1" smtClean="0"/>
+              <a:t>64 </a:t>
+            </a:r>
+            <a:r>
               <a:rPr lang="en-US" sz="4800" b="1" dirty="0" smtClean="0"/>
-              <a:t>Total 68 pts</a:t>
+              <a:t>pts</a:t>
             </a:r>
             <a:endParaRPr lang="en-US" sz="4800" b="1" dirty="0"/>
           </a:p>

</xml_diff>

<commit_message>
Fixed print 3 presentation
</commit_message>
<xml_diff>
--- a/Documents/Our Docs/Slides/Sprint3PresentationAdrian.pptx
+++ b/Documents/Our Docs/Slides/Sprint3PresentationAdrian.pptx
@@ -207,7 +207,7 @@
           <a:p>
             <a:fld id="{87857EF3-CB16-4D9F-BA52-FAE19D95CBEC}" type="datetimeFigureOut">
               <a:rPr lang="en-US" smtClean="0"/>
-              <a:t>3/23/2015</a:t>
+              <a:t>3/30/2015</a:t>
             </a:fld>
             <a:endParaRPr lang="en-US"/>
           </a:p>
@@ -690,7 +690,7 @@
           <a:p>
             <a:fld id="{EF7662E3-674D-464C-A6F0-577B5998971D}" type="datetimeFigureOut">
               <a:rPr lang="en-US" smtClean="0"/>
-              <a:t>3/23/2015</a:t>
+              <a:t>3/30/2015</a:t>
             </a:fld>
             <a:endParaRPr lang="en-US"/>
           </a:p>
@@ -860,7 +860,7 @@
           <a:p>
             <a:fld id="{EF7662E3-674D-464C-A6F0-577B5998971D}" type="datetimeFigureOut">
               <a:rPr lang="en-US" smtClean="0"/>
-              <a:t>3/23/2015</a:t>
+              <a:t>3/30/2015</a:t>
             </a:fld>
             <a:endParaRPr lang="en-US"/>
           </a:p>
@@ -1040,7 +1040,7 @@
           <a:p>
             <a:fld id="{EF7662E3-674D-464C-A6F0-577B5998971D}" type="datetimeFigureOut">
               <a:rPr lang="en-US" smtClean="0"/>
-              <a:t>3/23/2015</a:t>
+              <a:t>3/30/2015</a:t>
             </a:fld>
             <a:endParaRPr lang="en-US"/>
           </a:p>
@@ -1210,7 +1210,7 @@
           <a:p>
             <a:fld id="{EF7662E3-674D-464C-A6F0-577B5998971D}" type="datetimeFigureOut">
               <a:rPr lang="en-US" smtClean="0"/>
-              <a:t>3/23/2015</a:t>
+              <a:t>3/30/2015</a:t>
             </a:fld>
             <a:endParaRPr lang="en-US"/>
           </a:p>
@@ -1456,7 +1456,7 @@
           <a:p>
             <a:fld id="{EF7662E3-674D-464C-A6F0-577B5998971D}" type="datetimeFigureOut">
               <a:rPr lang="en-US" smtClean="0"/>
-              <a:t>3/23/2015</a:t>
+              <a:t>3/30/2015</a:t>
             </a:fld>
             <a:endParaRPr lang="en-US"/>
           </a:p>
@@ -1688,7 +1688,7 @@
           <a:p>
             <a:fld id="{EF7662E3-674D-464C-A6F0-577B5998971D}" type="datetimeFigureOut">
               <a:rPr lang="en-US" smtClean="0"/>
-              <a:t>3/23/2015</a:t>
+              <a:t>3/30/2015</a:t>
             </a:fld>
             <a:endParaRPr lang="en-US"/>
           </a:p>
@@ -2055,7 +2055,7 @@
           <a:p>
             <a:fld id="{EF7662E3-674D-464C-A6F0-577B5998971D}" type="datetimeFigureOut">
               <a:rPr lang="en-US" smtClean="0"/>
-              <a:t>3/23/2015</a:t>
+              <a:t>3/30/2015</a:t>
             </a:fld>
             <a:endParaRPr lang="en-US"/>
           </a:p>
@@ -2173,7 +2173,7 @@
           <a:p>
             <a:fld id="{EF7662E3-674D-464C-A6F0-577B5998971D}" type="datetimeFigureOut">
               <a:rPr lang="en-US" smtClean="0"/>
-              <a:t>3/23/2015</a:t>
+              <a:t>3/30/2015</a:t>
             </a:fld>
             <a:endParaRPr lang="en-US"/>
           </a:p>
@@ -2268,7 +2268,7 @@
           <a:p>
             <a:fld id="{EF7662E3-674D-464C-A6F0-577B5998971D}" type="datetimeFigureOut">
               <a:rPr lang="en-US" smtClean="0"/>
-              <a:t>3/23/2015</a:t>
+              <a:t>3/30/2015</a:t>
             </a:fld>
             <a:endParaRPr lang="en-US"/>
           </a:p>
@@ -2545,7 +2545,7 @@
           <a:p>
             <a:fld id="{EF7662E3-674D-464C-A6F0-577B5998971D}" type="datetimeFigureOut">
               <a:rPr lang="en-US" smtClean="0"/>
-              <a:t>3/23/2015</a:t>
+              <a:t>3/30/2015</a:t>
             </a:fld>
             <a:endParaRPr lang="en-US"/>
           </a:p>
@@ -2798,7 +2798,7 @@
           <a:p>
             <a:fld id="{EF7662E3-674D-464C-A6F0-577B5998971D}" type="datetimeFigureOut">
               <a:rPr lang="en-US" smtClean="0"/>
-              <a:t>3/23/2015</a:t>
+              <a:t>3/30/2015</a:t>
             </a:fld>
             <a:endParaRPr lang="en-US"/>
           </a:p>
@@ -3011,7 +3011,7 @@
           <a:p>
             <a:fld id="{EF7662E3-674D-464C-A6F0-577B5998971D}" type="datetimeFigureOut">
               <a:rPr lang="en-US" smtClean="0"/>
-              <a:t>3/23/2015</a:t>
+              <a:t>3/30/2015</a:t>
             </a:fld>
             <a:endParaRPr lang="en-US"/>
           </a:p>
@@ -3743,7 +3743,15 @@
           <a:p>
             <a:r>
               <a:rPr lang="en-US" sz="5400" b="1" dirty="0" smtClean="0"/>
-              <a:t>Sprint 3 Stories</a:t>
+              <a:t>Sprint </a:t>
+            </a:r>
+            <a:r>
+              <a:rPr lang="en-US" sz="5400" b="1" dirty="0" smtClean="0"/>
+              <a:t>4 </a:t>
+            </a:r>
+            <a:r>
+              <a:rPr lang="en-US" sz="5400" b="1" dirty="0" smtClean="0"/>
+              <a:t>Stories</a:t>
             </a:r>
             <a:endParaRPr lang="en-US" sz="5400" b="1" dirty="0"/>
           </a:p>
@@ -3757,7 +3765,7 @@
         </p:nvSpPr>
         <p:spPr>
           <a:xfrm>
-            <a:off x="6561705" y="2975043"/>
+            <a:off x="8062959" y="2633849"/>
             <a:ext cx="1777079" cy="1569660"/>
           </a:xfrm>
           <a:prstGeom prst="rect">
@@ -3773,7 +3781,11 @@
           <a:p>
             <a:r>
               <a:rPr lang="en-US" sz="4800" b="1" dirty="0" smtClean="0"/>
-              <a:t>Total 36 pts</a:t>
+              <a:t>Total </a:t>
+            </a:r>
+            <a:r>
+              <a:rPr lang="en-US" sz="4800" b="1" dirty="0" smtClean="0"/>
+              <a:t>40pts</a:t>
             </a:r>
             <a:endParaRPr lang="en-US" sz="4800" b="1" dirty="0"/>
           </a:p>
@@ -3781,7 +3793,7 @@
       </p:sp>
       <p:pic>
         <p:nvPicPr>
-          <p:cNvPr id="2" name="Picture 1"/>
+          <p:cNvPr id="3" name="Picture 2"/>
           <p:cNvPicPr>
             <a:picLocks noChangeAspect="1"/>
           </p:cNvPicPr>
@@ -3795,8 +3807,32 @@
         </p:blipFill>
         <p:spPr>
           <a:xfrm>
-            <a:off x="3807726" y="855091"/>
-            <a:ext cx="1651377" cy="5252432"/>
+            <a:off x="1979279" y="855091"/>
+            <a:ext cx="2633663" cy="5815534"/>
+          </a:xfrm>
+          <a:prstGeom prst="rect">
+            <a:avLst/>
+          </a:prstGeom>
+        </p:spPr>
+      </p:pic>
+      <p:pic>
+        <p:nvPicPr>
+          <p:cNvPr id="4" name="Picture 3"/>
+          <p:cNvPicPr>
+            <a:picLocks noChangeAspect="1"/>
+          </p:cNvPicPr>
+          <p:nvPr/>
+        </p:nvPicPr>
+        <p:blipFill>
+          <a:blip r:embed="rId3"/>
+          <a:stretch>
+            <a:fillRect/>
+          </a:stretch>
+        </p:blipFill>
+        <p:spPr>
+          <a:xfrm>
+            <a:off x="5117913" y="855091"/>
+            <a:ext cx="2279174" cy="4685900"/>
           </a:xfrm>
           <a:prstGeom prst="rect">
             <a:avLst/>
@@ -3924,11 +3960,7 @@
           <a:p>
             <a:r>
               <a:rPr lang="en-US" sz="4800" b="1" smtClean="0"/>
-              <a:t>Total </a:t>
-            </a:r>
-            <a:r>
-              <a:rPr lang="en-US" sz="4800" b="1" smtClean="0"/>
-              <a:t>64 </a:t>
+              <a:t>Total 64 </a:t>
             </a:r>
             <a:r>
               <a:rPr lang="en-US" sz="4800" b="1" dirty="0" smtClean="0"/>

</xml_diff>